<commit_message>
Added a concept picture for layout on a mobile phone
</commit_message>
<xml_diff>
--- a/instructions/instructions-slide.pptx
+++ b/instructions/instructions-slide.pptx
@@ -6,6 +6,7 @@
   </p:sldMasterIdLst>
   <p:sldIdLst>
     <p:sldId id="256" r:id="rId2"/>
+    <p:sldId id="257" r:id="rId3"/>
   </p:sldIdLst>
   <p:sldSz cx="12192000" cy="6858000"/>
   <p:notesSz cx="6858000" cy="9144000"/>
@@ -4079,6 +4080,357 @@
 </p:sld>
 </file>
 
+<file path=ppt/slides/slide2.xml><?xml version="1.0" encoding="utf-8"?>
+<p:sld xmlns:a="http://schemas.openxmlformats.org/drawingml/2006/main" xmlns:r="http://schemas.openxmlformats.org/officeDocument/2006/relationships" xmlns:p="http://schemas.openxmlformats.org/presentationml/2006/main">
+  <p:cSld>
+    <p:spTree>
+      <p:nvGrpSpPr>
+        <p:cNvPr id="1" name=""/>
+        <p:cNvGrpSpPr/>
+        <p:nvPr/>
+      </p:nvGrpSpPr>
+      <p:grpSpPr>
+        <a:xfrm>
+          <a:off x="0" y="0"/>
+          <a:ext cx="0" cy="0"/>
+          <a:chOff x="0" y="0"/>
+          <a:chExt cx="0" cy="0"/>
+        </a:xfrm>
+      </p:grpSpPr>
+      <p:pic>
+        <p:nvPicPr>
+          <p:cNvPr id="5" name="Picture 4" descr="Diagram&#10;&#10;Description automatically generated with medium confidence">
+            <a:extLst>
+              <a:ext uri="{FF2B5EF4-FFF2-40B4-BE49-F238E27FC236}">
+                <a16:creationId xmlns:a16="http://schemas.microsoft.com/office/drawing/2014/main" id="{0927DFB2-7FBD-5564-2F41-ADC72F25367A}"/>
+              </a:ext>
+            </a:extLst>
+          </p:cNvPr>
+          <p:cNvPicPr>
+            <a:picLocks noChangeAspect="1"/>
+          </p:cNvPicPr>
+          <p:nvPr/>
+        </p:nvPicPr>
+        <p:blipFill>
+          <a:blip r:embed="rId2"/>
+          <a:stretch>
+            <a:fillRect/>
+          </a:stretch>
+        </p:blipFill>
+        <p:spPr>
+          <a:xfrm>
+            <a:off x="3014869" y="0"/>
+            <a:ext cx="6162261" cy="4108174"/>
+          </a:xfrm>
+          <a:prstGeom prst="rect">
+            <a:avLst/>
+          </a:prstGeom>
+        </p:spPr>
+      </p:pic>
+      <p:sp>
+        <p:nvSpPr>
+          <p:cNvPr id="3" name="Oval 2">
+            <a:extLst>
+              <a:ext uri="{FF2B5EF4-FFF2-40B4-BE49-F238E27FC236}">
+                <a16:creationId xmlns:a16="http://schemas.microsoft.com/office/drawing/2014/main" id="{257F739A-9686-4ACB-24C7-9345F14FE2EF}"/>
+              </a:ext>
+            </a:extLst>
+          </p:cNvPr>
+          <p:cNvSpPr/>
+          <p:nvPr/>
+        </p:nvSpPr>
+        <p:spPr>
+          <a:xfrm>
+            <a:off x="4457077" y="4214190"/>
+            <a:ext cx="3277843" cy="1262271"/>
+          </a:xfrm>
+          <a:prstGeom prst="ellipse">
+            <a:avLst/>
+          </a:prstGeom>
+        </p:spPr>
+        <p:style>
+          <a:lnRef idx="2">
+            <a:schemeClr val="accent1">
+              <a:shade val="50000"/>
+            </a:schemeClr>
+          </a:lnRef>
+          <a:fillRef idx="1">
+            <a:schemeClr val="accent1"/>
+          </a:fillRef>
+          <a:effectRef idx="0">
+            <a:schemeClr val="accent1"/>
+          </a:effectRef>
+          <a:fontRef idx="minor">
+            <a:schemeClr val="lt1"/>
+          </a:fontRef>
+        </p:style>
+        <p:txBody>
+          <a:bodyPr rtlCol="0" anchor="ctr"/>
+          <a:lstStyle/>
+          <a:p>
+            <a:pPr algn="ctr"/>
+            <a:r>
+              <a:rPr lang="en-GB" dirty="0"/>
+              <a:t>t</a:t>
+            </a:r>
+            <a:r>
+              <a:rPr lang="en-NO" dirty="0"/>
+              <a:t>oggle bias </a:t>
+            </a:r>
+          </a:p>
+        </p:txBody>
+      </p:sp>
+      <p:sp>
+        <p:nvSpPr>
+          <p:cNvPr id="6" name="Rectangle 5">
+            <a:extLst>
+              <a:ext uri="{FF2B5EF4-FFF2-40B4-BE49-F238E27FC236}">
+                <a16:creationId xmlns:a16="http://schemas.microsoft.com/office/drawing/2014/main" id="{7072AA0A-903E-E78C-4B37-658C0E9609FE}"/>
+              </a:ext>
+            </a:extLst>
+          </p:cNvPr>
+          <p:cNvSpPr/>
+          <p:nvPr/>
+        </p:nvSpPr>
+        <p:spPr>
+          <a:xfrm>
+            <a:off x="3014868" y="5575853"/>
+            <a:ext cx="1626705" cy="367747"/>
+          </a:xfrm>
+          <a:prstGeom prst="rect">
+            <a:avLst/>
+          </a:prstGeom>
+        </p:spPr>
+        <p:style>
+          <a:lnRef idx="2">
+            <a:schemeClr val="accent1">
+              <a:shade val="50000"/>
+            </a:schemeClr>
+          </a:lnRef>
+          <a:fillRef idx="1">
+            <a:schemeClr val="accent1"/>
+          </a:fillRef>
+          <a:effectRef idx="0">
+            <a:schemeClr val="accent1"/>
+          </a:effectRef>
+          <a:fontRef idx="minor">
+            <a:schemeClr val="lt1"/>
+          </a:fontRef>
+        </p:style>
+        <p:txBody>
+          <a:bodyPr rtlCol="0" anchor="ctr"/>
+          <a:lstStyle/>
+          <a:p>
+            <a:pPr algn="ctr"/>
+            <a:r>
+              <a:rPr lang="en-NO" dirty="0"/>
+              <a:t>Pause</a:t>
+            </a:r>
+          </a:p>
+        </p:txBody>
+      </p:sp>
+      <p:sp>
+        <p:nvSpPr>
+          <p:cNvPr id="20" name="Rectangle 19">
+            <a:extLst>
+              <a:ext uri="{FF2B5EF4-FFF2-40B4-BE49-F238E27FC236}">
+                <a16:creationId xmlns:a16="http://schemas.microsoft.com/office/drawing/2014/main" id="{5A4600B2-8CD4-9BF9-F7DB-68FB956DE30F}"/>
+              </a:ext>
+            </a:extLst>
+          </p:cNvPr>
+          <p:cNvSpPr/>
+          <p:nvPr/>
+        </p:nvSpPr>
+        <p:spPr>
+          <a:xfrm>
+            <a:off x="7550425" y="5575852"/>
+            <a:ext cx="1626705" cy="367747"/>
+          </a:xfrm>
+          <a:prstGeom prst="rect">
+            <a:avLst/>
+          </a:prstGeom>
+        </p:spPr>
+        <p:style>
+          <a:lnRef idx="2">
+            <a:schemeClr val="accent1">
+              <a:shade val="50000"/>
+            </a:schemeClr>
+          </a:lnRef>
+          <a:fillRef idx="1">
+            <a:schemeClr val="accent1"/>
+          </a:fillRef>
+          <a:effectRef idx="0">
+            <a:schemeClr val="accent1"/>
+          </a:effectRef>
+          <a:fontRef idx="minor">
+            <a:schemeClr val="lt1"/>
+          </a:fontRef>
+        </p:style>
+        <p:txBody>
+          <a:bodyPr rtlCol="0" anchor="ctr"/>
+          <a:lstStyle/>
+          <a:p>
+            <a:pPr algn="ctr"/>
+            <a:r>
+              <a:rPr lang="en-NO" dirty="0"/>
+              <a:t>Pull back</a:t>
+            </a:r>
+          </a:p>
+        </p:txBody>
+      </p:sp>
+      <p:sp>
+        <p:nvSpPr>
+          <p:cNvPr id="21" name="TextBox 20">
+            <a:extLst>
+              <a:ext uri="{FF2B5EF4-FFF2-40B4-BE49-F238E27FC236}">
+                <a16:creationId xmlns:a16="http://schemas.microsoft.com/office/drawing/2014/main" id="{7DE9DE64-7246-3547-157D-E25CCA79A5D0}"/>
+              </a:ext>
+            </a:extLst>
+          </p:cNvPr>
+          <p:cNvSpPr txBox="1"/>
+          <p:nvPr/>
+        </p:nvSpPr>
+        <p:spPr>
+          <a:xfrm>
+            <a:off x="3014868" y="6042992"/>
+            <a:ext cx="2879036" cy="369332"/>
+          </a:xfrm>
+          <a:prstGeom prst="rect">
+            <a:avLst/>
+          </a:prstGeom>
+          <a:noFill/>
+        </p:spPr>
+        <p:txBody>
+          <a:bodyPr wrap="square" rtlCol="0">
+            <a:spAutoFit/>
+          </a:bodyPr>
+          <a:lstStyle/>
+          <a:p>
+            <a:r>
+              <a:rPr lang="en-NO" dirty="0"/>
+              <a:t>Fog of uncertainty</a:t>
+            </a:r>
+          </a:p>
+        </p:txBody>
+      </p:sp>
+      <p:sp>
+        <p:nvSpPr>
+          <p:cNvPr id="23" name="TextBox 22">
+            <a:extLst>
+              <a:ext uri="{FF2B5EF4-FFF2-40B4-BE49-F238E27FC236}">
+                <a16:creationId xmlns:a16="http://schemas.microsoft.com/office/drawing/2014/main" id="{9317CE3C-BBE3-0181-94B4-DEFBE6E5B5EA}"/>
+              </a:ext>
+            </a:extLst>
+          </p:cNvPr>
+          <p:cNvSpPr txBox="1"/>
+          <p:nvPr/>
+        </p:nvSpPr>
+        <p:spPr>
+          <a:xfrm>
+            <a:off x="7550425" y="6042990"/>
+            <a:ext cx="1626705" cy="369332"/>
+          </a:xfrm>
+          <a:prstGeom prst="rect">
+            <a:avLst/>
+          </a:prstGeom>
+          <a:noFill/>
+        </p:spPr>
+        <p:txBody>
+          <a:bodyPr wrap="square">
+            <a:spAutoFit/>
+          </a:bodyPr>
+          <a:lstStyle/>
+          <a:p>
+            <a:r>
+              <a:rPr lang="en-NO" dirty="0"/>
+              <a:t>Steering limits </a:t>
+            </a:r>
+          </a:p>
+        </p:txBody>
+      </p:sp>
+      <p:sp>
+        <p:nvSpPr>
+          <p:cNvPr id="24" name="TextBox 23">
+            <a:extLst>
+              <a:ext uri="{FF2B5EF4-FFF2-40B4-BE49-F238E27FC236}">
+                <a16:creationId xmlns:a16="http://schemas.microsoft.com/office/drawing/2014/main" id="{5C5DD265-4962-B1E8-56FE-623A113AFA27}"/>
+              </a:ext>
+            </a:extLst>
+          </p:cNvPr>
+          <p:cNvSpPr txBox="1"/>
+          <p:nvPr/>
+        </p:nvSpPr>
+        <p:spPr>
+          <a:xfrm>
+            <a:off x="3014868" y="6412322"/>
+            <a:ext cx="1291379" cy="369332"/>
+          </a:xfrm>
+          <a:prstGeom prst="rect">
+            <a:avLst/>
+          </a:prstGeom>
+          <a:noFill/>
+        </p:spPr>
+        <p:txBody>
+          <a:bodyPr wrap="none" rtlCol="0">
+            <a:spAutoFit/>
+          </a:bodyPr>
+          <a:lstStyle/>
+          <a:p>
+            <a:r>
+              <a:rPr lang="en-NO" dirty="0"/>
+              <a:t>Instructions</a:t>
+            </a:r>
+          </a:p>
+        </p:txBody>
+      </p:sp>
+      <p:sp>
+        <p:nvSpPr>
+          <p:cNvPr id="25" name="TextBox 24">
+            <a:extLst>
+              <a:ext uri="{FF2B5EF4-FFF2-40B4-BE49-F238E27FC236}">
+                <a16:creationId xmlns:a16="http://schemas.microsoft.com/office/drawing/2014/main" id="{59D9B9AC-D5A2-6A19-A201-B0198E77882F}"/>
+              </a:ext>
+            </a:extLst>
+          </p:cNvPr>
+          <p:cNvSpPr txBox="1"/>
+          <p:nvPr/>
+        </p:nvSpPr>
+        <p:spPr>
+          <a:xfrm>
+            <a:off x="5549248" y="6412322"/>
+            <a:ext cx="1093504" cy="369332"/>
+          </a:xfrm>
+          <a:prstGeom prst="rect">
+            <a:avLst/>
+          </a:prstGeom>
+          <a:noFill/>
+        </p:spPr>
+        <p:txBody>
+          <a:bodyPr wrap="none" rtlCol="0">
+            <a:spAutoFit/>
+          </a:bodyPr>
+          <a:lstStyle/>
+          <a:p>
+            <a:r>
+              <a:rPr lang="en-NO" dirty="0"/>
+              <a:t>Copyright</a:t>
+            </a:r>
+          </a:p>
+        </p:txBody>
+      </p:sp>
+    </p:spTree>
+    <p:extLst>
+      <p:ext uri="{BB962C8B-B14F-4D97-AF65-F5344CB8AC3E}">
+        <p14:creationId xmlns:p14="http://schemas.microsoft.com/office/powerpoint/2010/main" val="3216619613"/>
+      </p:ext>
+    </p:extLst>
+  </p:cSld>
+  <p:clrMapOvr>
+    <a:masterClrMapping/>
+  </p:clrMapOvr>
+</p:sld>
+</file>
+
 <file path=ppt/theme/theme1.xml><?xml version="1.0" encoding="utf-8"?>
 <a:theme xmlns:a="http://schemas.openxmlformats.org/drawingml/2006/main" name="Office Theme">
   <a:themeElements>

</xml_diff>